<commit_message>
Modified the report file so that we know who is doing what. Basic Changes only there.
</commit_message>
<xml_diff>
--- a/Log/Final Presentation.pptx
+++ b/Log/Final Presentation.pptx
@@ -296,6 +296,7 @@
           <a:p>
             <a:fld id="{3785BEF8-D89A-D14A-9871-7082123583EF}" type="datetimeFigureOut">
               <a:rPr lang="sv-SE" smtClean="0"/>
+              <a:pPr/>
               <a:t>15-01-12</a:t>
             </a:fld>
             <a:endParaRPr lang="sv-SE" dirty="0"/>
@@ -338,6 +339,7 @@
           <a:p>
             <a:fld id="{B5F46CFF-14A6-9A42-ACF1-84843C91542B}" type="slidenum">
               <a:rPr lang="sv-SE" smtClean="0"/>
+              <a:pPr/>
               <a:t>‹Nr.›</a:t>
             </a:fld>
             <a:endParaRPr lang="sv-SE" dirty="0"/>
@@ -461,6 +463,7 @@
           <a:p>
             <a:fld id="{3785BEF8-D89A-D14A-9871-7082123583EF}" type="datetimeFigureOut">
               <a:rPr lang="sv-SE" smtClean="0"/>
+              <a:pPr/>
               <a:t>15-01-12</a:t>
             </a:fld>
             <a:endParaRPr lang="sv-SE" dirty="0"/>
@@ -503,6 +506,7 @@
           <a:p>
             <a:fld id="{B5F46CFF-14A6-9A42-ACF1-84843C91542B}" type="slidenum">
               <a:rPr lang="sv-SE" smtClean="0"/>
+              <a:pPr/>
               <a:t>‹Nr.›</a:t>
             </a:fld>
             <a:endParaRPr lang="sv-SE" dirty="0"/>
@@ -636,6 +640,7 @@
           <a:p>
             <a:fld id="{3785BEF8-D89A-D14A-9871-7082123583EF}" type="datetimeFigureOut">
               <a:rPr lang="sv-SE" smtClean="0"/>
+              <a:pPr/>
               <a:t>15-01-12</a:t>
             </a:fld>
             <a:endParaRPr lang="sv-SE" dirty="0"/>
@@ -678,6 +683,7 @@
           <a:p>
             <a:fld id="{B5F46CFF-14A6-9A42-ACF1-84843C91542B}" type="slidenum">
               <a:rPr lang="sv-SE" smtClean="0"/>
+              <a:pPr/>
               <a:t>‹Nr.›</a:t>
             </a:fld>
             <a:endParaRPr lang="sv-SE" dirty="0"/>
@@ -801,6 +807,7 @@
           <a:p>
             <a:fld id="{3785BEF8-D89A-D14A-9871-7082123583EF}" type="datetimeFigureOut">
               <a:rPr lang="sv-SE" smtClean="0"/>
+              <a:pPr/>
               <a:t>15-01-12</a:t>
             </a:fld>
             <a:endParaRPr lang="sv-SE" dirty="0"/>
@@ -843,6 +850,7 @@
           <a:p>
             <a:fld id="{B5F46CFF-14A6-9A42-ACF1-84843C91542B}" type="slidenum">
               <a:rPr lang="sv-SE" smtClean="0"/>
+              <a:pPr/>
               <a:t>‹Nr.›</a:t>
             </a:fld>
             <a:endParaRPr lang="sv-SE" dirty="0"/>
@@ -1042,6 +1050,7 @@
           <a:p>
             <a:fld id="{3785BEF8-D89A-D14A-9871-7082123583EF}" type="datetimeFigureOut">
               <a:rPr lang="sv-SE" smtClean="0"/>
+              <a:pPr/>
               <a:t>15-01-12</a:t>
             </a:fld>
             <a:endParaRPr lang="sv-SE" dirty="0"/>
@@ -1084,6 +1093,7 @@
           <a:p>
             <a:fld id="{B5F46CFF-14A6-9A42-ACF1-84843C91542B}" type="slidenum">
               <a:rPr lang="sv-SE" smtClean="0"/>
+              <a:pPr/>
               <a:t>‹Nr.›</a:t>
             </a:fld>
             <a:endParaRPr lang="sv-SE" dirty="0"/>
@@ -1325,6 +1335,7 @@
           <a:p>
             <a:fld id="{3785BEF8-D89A-D14A-9871-7082123583EF}" type="datetimeFigureOut">
               <a:rPr lang="sv-SE" smtClean="0"/>
+              <a:pPr/>
               <a:t>15-01-12</a:t>
             </a:fld>
             <a:endParaRPr lang="sv-SE" dirty="0"/>
@@ -1367,6 +1378,7 @@
           <a:p>
             <a:fld id="{B5F46CFF-14A6-9A42-ACF1-84843C91542B}" type="slidenum">
               <a:rPr lang="sv-SE" smtClean="0"/>
+              <a:pPr/>
               <a:t>‹Nr.›</a:t>
             </a:fld>
             <a:endParaRPr lang="sv-SE" dirty="0"/>
@@ -1742,6 +1754,7 @@
           <a:p>
             <a:fld id="{3785BEF8-D89A-D14A-9871-7082123583EF}" type="datetimeFigureOut">
               <a:rPr lang="sv-SE" smtClean="0"/>
+              <a:pPr/>
               <a:t>15-01-12</a:t>
             </a:fld>
             <a:endParaRPr lang="sv-SE" dirty="0"/>
@@ -1784,6 +1797,7 @@
           <a:p>
             <a:fld id="{B5F46CFF-14A6-9A42-ACF1-84843C91542B}" type="slidenum">
               <a:rPr lang="sv-SE" smtClean="0"/>
+              <a:pPr/>
               <a:t>‹Nr.›</a:t>
             </a:fld>
             <a:endParaRPr lang="sv-SE" dirty="0"/>
@@ -1855,6 +1869,7 @@
           <a:p>
             <a:fld id="{3785BEF8-D89A-D14A-9871-7082123583EF}" type="datetimeFigureOut">
               <a:rPr lang="sv-SE" smtClean="0"/>
+              <a:pPr/>
               <a:t>15-01-12</a:t>
             </a:fld>
             <a:endParaRPr lang="sv-SE" dirty="0"/>
@@ -1897,6 +1912,7 @@
           <a:p>
             <a:fld id="{B5F46CFF-14A6-9A42-ACF1-84843C91542B}" type="slidenum">
               <a:rPr lang="sv-SE" smtClean="0"/>
+              <a:pPr/>
               <a:t>‹Nr.›</a:t>
             </a:fld>
             <a:endParaRPr lang="sv-SE" dirty="0"/>
@@ -1945,6 +1961,7 @@
           <a:p>
             <a:fld id="{3785BEF8-D89A-D14A-9871-7082123583EF}" type="datetimeFigureOut">
               <a:rPr lang="sv-SE" smtClean="0"/>
+              <a:pPr/>
               <a:t>15-01-12</a:t>
             </a:fld>
             <a:endParaRPr lang="sv-SE" dirty="0"/>
@@ -1987,6 +2004,7 @@
           <a:p>
             <a:fld id="{B5F46CFF-14A6-9A42-ACF1-84843C91542B}" type="slidenum">
               <a:rPr lang="sv-SE" smtClean="0"/>
+              <a:pPr/>
               <a:t>‹Nr.›</a:t>
             </a:fld>
             <a:endParaRPr lang="sv-SE" dirty="0"/>
@@ -2217,6 +2235,7 @@
           <a:p>
             <a:fld id="{3785BEF8-D89A-D14A-9871-7082123583EF}" type="datetimeFigureOut">
               <a:rPr lang="sv-SE" smtClean="0"/>
+              <a:pPr/>
               <a:t>15-01-12</a:t>
             </a:fld>
             <a:endParaRPr lang="sv-SE" dirty="0"/>
@@ -2259,6 +2278,7 @@
           <a:p>
             <a:fld id="{B5F46CFF-14A6-9A42-ACF1-84843C91542B}" type="slidenum">
               <a:rPr lang="sv-SE" smtClean="0"/>
+              <a:pPr/>
               <a:t>‹Nr.›</a:t>
             </a:fld>
             <a:endParaRPr lang="sv-SE" dirty="0"/>
@@ -2465,6 +2485,7 @@
           <a:p>
             <a:fld id="{3785BEF8-D89A-D14A-9871-7082123583EF}" type="datetimeFigureOut">
               <a:rPr lang="sv-SE" smtClean="0"/>
+              <a:pPr/>
               <a:t>15-01-12</a:t>
             </a:fld>
             <a:endParaRPr lang="sv-SE" dirty="0"/>
@@ -2507,6 +2528,7 @@
           <a:p>
             <a:fld id="{B5F46CFF-14A6-9A42-ACF1-84843C91542B}" type="slidenum">
               <a:rPr lang="sv-SE" smtClean="0"/>
+              <a:pPr/>
               <a:t>‹Nr.›</a:t>
             </a:fld>
             <a:endParaRPr lang="sv-SE" dirty="0"/>
@@ -2673,6 +2695,7 @@
           <a:p>
             <a:fld id="{3785BEF8-D89A-D14A-9871-7082123583EF}" type="datetimeFigureOut">
               <a:rPr lang="sv-SE" smtClean="0"/>
+              <a:pPr/>
               <a:t>15-01-12</a:t>
             </a:fld>
             <a:endParaRPr lang="sv-SE" dirty="0"/>
@@ -2751,6 +2774,7 @@
           <a:p>
             <a:fld id="{B5F46CFF-14A6-9A42-ACF1-84843C91542B}" type="slidenum">
               <a:rPr lang="sv-SE" smtClean="0"/>
+              <a:pPr/>
               <a:t>‹Nr.›</a:t>
             </a:fld>
             <a:endParaRPr lang="sv-SE" dirty="0"/>
@@ -3421,7 +3445,6 @@
               <a:rPr lang="en-US" dirty="0" smtClean="0"/>
               <a:t>Opening Times</a:t>
             </a:r>
-            <a:endParaRPr lang="en-US" dirty="0" smtClean="0"/>
           </a:p>
           <a:p>
             <a:r>
@@ -3531,38 +3554,39 @@
           <a:p>
             <a:r>
               <a:rPr lang="en-US" dirty="0" smtClean="0"/>
-              <a:t>Lack of it</a:t>
-            </a:r>
-          </a:p>
-          <a:p>
+              <a:t>Lack of </a:t>
+            </a:r>
+            <a:r>
+              <a:rPr lang="en-US" dirty="0" smtClean="0"/>
+              <a:t>it</a:t>
+            </a:r>
+          </a:p>
+          <a:p>
+            <a:r>
+              <a:rPr lang="en-US" dirty="0" smtClean="0"/>
+              <a:t>MVC</a:t>
+            </a:r>
+          </a:p>
+          <a:p>
+            <a:r>
+              <a:rPr lang="en-US" dirty="0" err="1" smtClean="0"/>
+              <a:t>Sprin</a:t>
+            </a:r>
             <a:endParaRPr lang="en-US" dirty="0" smtClean="0"/>
           </a:p>
           <a:p>
             <a:r>
-              <a:rPr lang="en-US" dirty="0" smtClean="0"/>
-              <a:t>MVC</a:t>
-            </a:r>
-          </a:p>
-          <a:p>
+              <a:rPr lang="en-US" dirty="0" err="1" smtClean="0"/>
+              <a:t>DBTranslator</a:t>
+            </a:r>
             <a:endParaRPr lang="en-US" dirty="0" smtClean="0"/>
           </a:p>
           <a:p>
             <a:r>
-              <a:rPr lang="en-US" dirty="0" smtClean="0"/>
-              <a:t>Spring</a:t>
-            </a:r>
-          </a:p>
-          <a:p>
-            <a:pPr>
-              <a:buNone/>
-            </a:pPr>
-            <a:endParaRPr lang="en-US" dirty="0" smtClean="0"/>
-          </a:p>
-          <a:p>
-            <a:r>
-              <a:rPr lang="en-US" dirty="0" smtClean="0"/>
-              <a:t>DBTranslator</a:t>
-            </a:r>
+              <a:rPr lang="en-US" smtClean="0"/>
+              <a:t>Maven</a:t>
+            </a:r>
+            <a:endParaRPr lang="en-US" smtClean="0"/>
           </a:p>
           <a:p>
             <a:endParaRPr lang="en-US" dirty="0" smtClean="0"/>

</xml_diff>